<commit_message>
final commit \ o /
</commit_message>
<xml_diff>
--- a/JadorePowerPoint.pptx
+++ b/JadorePowerPoint.pptx
@@ -104,6 +104,11 @@
       </a:defRPr>
     </a:lvl9pPr>
   </p:defaultTextStyle>
+  <p:extLst>
+    <p:ext uri="{EFAFB233-063F-42B5-8137-9DF3F51BA10A}">
+      <p15:sldGuideLst xmlns:p15="http://schemas.microsoft.com/office/powerpoint/2012/main"/>
+    </p:ext>
+  </p:extLst>
 </p:presentation>
 </file>
 
@@ -238,7 +243,7 @@
           <a:p>
             <a:fld id="{4DE1A191-6B33-463A-BC49-C8E62AF62468}" type="datetimeFigureOut">
               <a:rPr lang="fr-CH" smtClean="0"/>
-              <a:t>20.06.2013</a:t>
+              <a:t>21.06.2013</a:t>
             </a:fld>
             <a:endParaRPr lang="fr-CH"/>
           </a:p>
@@ -408,7 +413,7 @@
           <a:p>
             <a:fld id="{4DE1A191-6B33-463A-BC49-C8E62AF62468}" type="datetimeFigureOut">
               <a:rPr lang="fr-CH" smtClean="0"/>
-              <a:t>20.06.2013</a:t>
+              <a:t>21.06.2013</a:t>
             </a:fld>
             <a:endParaRPr lang="fr-CH"/>
           </a:p>
@@ -588,7 +593,7 @@
           <a:p>
             <a:fld id="{4DE1A191-6B33-463A-BC49-C8E62AF62468}" type="datetimeFigureOut">
               <a:rPr lang="fr-CH" smtClean="0"/>
-              <a:t>20.06.2013</a:t>
+              <a:t>21.06.2013</a:t>
             </a:fld>
             <a:endParaRPr lang="fr-CH"/>
           </a:p>
@@ -758,7 +763,7 @@
           <a:p>
             <a:fld id="{4DE1A191-6B33-463A-BC49-C8E62AF62468}" type="datetimeFigureOut">
               <a:rPr lang="fr-CH" smtClean="0"/>
-              <a:t>20.06.2013</a:t>
+              <a:t>21.06.2013</a:t>
             </a:fld>
             <a:endParaRPr lang="fr-CH"/>
           </a:p>
@@ -1004,7 +1009,7 @@
           <a:p>
             <a:fld id="{4DE1A191-6B33-463A-BC49-C8E62AF62468}" type="datetimeFigureOut">
               <a:rPr lang="fr-CH" smtClean="0"/>
-              <a:t>20.06.2013</a:t>
+              <a:t>21.06.2013</a:t>
             </a:fld>
             <a:endParaRPr lang="fr-CH"/>
           </a:p>
@@ -1236,7 +1241,7 @@
           <a:p>
             <a:fld id="{4DE1A191-6B33-463A-BC49-C8E62AF62468}" type="datetimeFigureOut">
               <a:rPr lang="fr-CH" smtClean="0"/>
-              <a:t>20.06.2013</a:t>
+              <a:t>21.06.2013</a:t>
             </a:fld>
             <a:endParaRPr lang="fr-CH"/>
           </a:p>
@@ -1603,7 +1608,7 @@
           <a:p>
             <a:fld id="{4DE1A191-6B33-463A-BC49-C8E62AF62468}" type="datetimeFigureOut">
               <a:rPr lang="fr-CH" smtClean="0"/>
-              <a:t>20.06.2013</a:t>
+              <a:t>21.06.2013</a:t>
             </a:fld>
             <a:endParaRPr lang="fr-CH"/>
           </a:p>
@@ -1721,7 +1726,7 @@
           <a:p>
             <a:fld id="{4DE1A191-6B33-463A-BC49-C8E62AF62468}" type="datetimeFigureOut">
               <a:rPr lang="fr-CH" smtClean="0"/>
-              <a:t>20.06.2013</a:t>
+              <a:t>21.06.2013</a:t>
             </a:fld>
             <a:endParaRPr lang="fr-CH"/>
           </a:p>
@@ -1816,7 +1821,7 @@
           <a:p>
             <a:fld id="{4DE1A191-6B33-463A-BC49-C8E62AF62468}" type="datetimeFigureOut">
               <a:rPr lang="fr-CH" smtClean="0"/>
-              <a:t>20.06.2013</a:t>
+              <a:t>21.06.2013</a:t>
             </a:fld>
             <a:endParaRPr lang="fr-CH"/>
           </a:p>
@@ -2093,7 +2098,7 @@
           <a:p>
             <a:fld id="{4DE1A191-6B33-463A-BC49-C8E62AF62468}" type="datetimeFigureOut">
               <a:rPr lang="fr-CH" smtClean="0"/>
-              <a:t>20.06.2013</a:t>
+              <a:t>21.06.2013</a:t>
             </a:fld>
             <a:endParaRPr lang="fr-CH"/>
           </a:p>
@@ -2346,7 +2351,7 @@
           <a:p>
             <a:fld id="{4DE1A191-6B33-463A-BC49-C8E62AF62468}" type="datetimeFigureOut">
               <a:rPr lang="fr-CH" smtClean="0"/>
-              <a:t>20.06.2013</a:t>
+              <a:t>21.06.2013</a:t>
             </a:fld>
             <a:endParaRPr lang="fr-CH"/>
           </a:p>
@@ -2559,7 +2564,7 @@
           <a:p>
             <a:fld id="{4DE1A191-6B33-463A-BC49-C8E62AF62468}" type="datetimeFigureOut">
               <a:rPr lang="fr-CH" smtClean="0"/>
-              <a:t>20.06.2013</a:t>
+              <a:t>21.06.2013</a:t>
             </a:fld>
             <a:endParaRPr lang="fr-CH"/>
           </a:p>
@@ -2966,189 +2971,6 @@
       </p:grpSpPr>
       <p:sp>
         <p:nvSpPr>
-          <p:cNvPr id="13" name="Oval 12"/>
-          <p:cNvSpPr/>
-          <p:nvPr/>
-        </p:nvSpPr>
-        <p:spPr>
-          <a:xfrm>
-            <a:off x="8161234" y="3905423"/>
-            <a:ext cx="1965532" cy="839347"/>
-          </a:xfrm>
-          <a:prstGeom prst="ellipse">
-            <a:avLst/>
-          </a:prstGeom>
-          <a:ln>
-            <a:noFill/>
-          </a:ln>
-          <a:effectLst>
-            <a:outerShdw blurRad="149987" dist="250190" dir="8460000" algn="ctr">
-              <a:srgbClr val="000000">
-                <a:alpha val="28000"/>
-              </a:srgbClr>
-            </a:outerShdw>
-          </a:effectLst>
-          <a:scene3d>
-            <a:camera prst="orthographicFront">
-              <a:rot lat="0" lon="0" rev="0"/>
-            </a:camera>
-            <a:lightRig rig="contrasting" dir="t">
-              <a:rot lat="0" lon="0" rev="1500000"/>
-            </a:lightRig>
-          </a:scene3d>
-          <a:sp3d prstMaterial="metal">
-            <a:bevelT w="88900" h="88900"/>
-          </a:sp3d>
-        </p:spPr>
-        <p:style>
-          <a:lnRef idx="2">
-            <a:schemeClr val="accent1">
-              <a:shade val="50000"/>
-            </a:schemeClr>
-          </a:lnRef>
-          <a:fillRef idx="1">
-            <a:schemeClr val="accent1"/>
-          </a:fillRef>
-          <a:effectRef idx="0">
-            <a:schemeClr val="accent1"/>
-          </a:effectRef>
-          <a:fontRef idx="minor">
-            <a:schemeClr val="lt1"/>
-          </a:fontRef>
-        </p:style>
-        <p:txBody>
-          <a:bodyPr rtlCol="0" anchor="ctr"/>
-          <a:lstStyle/>
-          <a:p>
-            <a:pPr algn="ctr"/>
-            <a:endParaRPr lang="fr-CH"/>
-          </a:p>
-        </p:txBody>
-      </p:sp>
-      <p:sp>
-        <p:nvSpPr>
-          <p:cNvPr id="12" name="Oval 11"/>
-          <p:cNvSpPr/>
-          <p:nvPr/>
-        </p:nvSpPr>
-        <p:spPr>
-          <a:xfrm>
-            <a:off x="5285572" y="3913974"/>
-            <a:ext cx="1427145" cy="812772"/>
-          </a:xfrm>
-          <a:prstGeom prst="ellipse">
-            <a:avLst/>
-          </a:prstGeom>
-          <a:ln>
-            <a:noFill/>
-          </a:ln>
-          <a:effectLst>
-            <a:outerShdw blurRad="149987" dist="250190" dir="8460000" algn="ctr">
-              <a:srgbClr val="000000">
-                <a:alpha val="28000"/>
-              </a:srgbClr>
-            </a:outerShdw>
-          </a:effectLst>
-          <a:scene3d>
-            <a:camera prst="orthographicFront">
-              <a:rot lat="0" lon="0" rev="0"/>
-            </a:camera>
-            <a:lightRig rig="contrasting" dir="t">
-              <a:rot lat="0" lon="0" rev="1500000"/>
-            </a:lightRig>
-          </a:scene3d>
-          <a:sp3d prstMaterial="metal">
-            <a:bevelT w="88900" h="88900"/>
-          </a:sp3d>
-        </p:spPr>
-        <p:style>
-          <a:lnRef idx="2">
-            <a:schemeClr val="accent1">
-              <a:shade val="50000"/>
-            </a:schemeClr>
-          </a:lnRef>
-          <a:fillRef idx="1">
-            <a:schemeClr val="accent1"/>
-          </a:fillRef>
-          <a:effectRef idx="0">
-            <a:schemeClr val="accent1"/>
-          </a:effectRef>
-          <a:fontRef idx="minor">
-            <a:schemeClr val="lt1"/>
-          </a:fontRef>
-        </p:style>
-        <p:txBody>
-          <a:bodyPr rtlCol="0" anchor="ctr"/>
-          <a:lstStyle/>
-          <a:p>
-            <a:pPr algn="ctr"/>
-            <a:endParaRPr lang="fr-CH"/>
-          </a:p>
-        </p:txBody>
-      </p:sp>
-      <p:sp>
-        <p:nvSpPr>
-          <p:cNvPr id="11" name="Oval 10"/>
-          <p:cNvSpPr/>
-          <p:nvPr/>
-        </p:nvSpPr>
-        <p:spPr>
-          <a:xfrm>
-            <a:off x="2521010" y="3879792"/>
-            <a:ext cx="931491" cy="881136"/>
-          </a:xfrm>
-          <a:prstGeom prst="ellipse">
-            <a:avLst/>
-          </a:prstGeom>
-          <a:ln>
-            <a:noFill/>
-          </a:ln>
-          <a:effectLst>
-            <a:outerShdw blurRad="149987" dist="250190" dir="8460000" algn="ctr">
-              <a:srgbClr val="000000">
-                <a:alpha val="28000"/>
-              </a:srgbClr>
-            </a:outerShdw>
-          </a:effectLst>
-          <a:scene3d>
-            <a:camera prst="orthographicFront">
-              <a:rot lat="0" lon="0" rev="0"/>
-            </a:camera>
-            <a:lightRig rig="contrasting" dir="t">
-              <a:rot lat="0" lon="0" rev="1500000"/>
-            </a:lightRig>
-          </a:scene3d>
-          <a:sp3d prstMaterial="metal">
-            <a:bevelT w="88900" h="88900"/>
-          </a:sp3d>
-        </p:spPr>
-        <p:style>
-          <a:lnRef idx="2">
-            <a:schemeClr val="accent1">
-              <a:shade val="50000"/>
-            </a:schemeClr>
-          </a:lnRef>
-          <a:fillRef idx="1">
-            <a:schemeClr val="accent1"/>
-          </a:fillRef>
-          <a:effectRef idx="0">
-            <a:schemeClr val="accent1"/>
-          </a:effectRef>
-          <a:fontRef idx="minor">
-            <a:schemeClr val="lt1"/>
-          </a:fontRef>
-        </p:style>
-        <p:txBody>
-          <a:bodyPr rtlCol="0" anchor="ctr"/>
-          <a:lstStyle/>
-          <a:p>
-            <a:pPr algn="ctr"/>
-            <a:endParaRPr lang="fr-CH"/>
-          </a:p>
-        </p:txBody>
-      </p:sp>
-      <p:sp>
-        <p:nvSpPr>
           <p:cNvPr id="4" name="Oval 3"/>
           <p:cNvSpPr/>
           <p:nvPr/>
@@ -3329,103 +3151,630 @@
           </a:p>
         </p:txBody>
       </p:sp>
-      <p:sp>
-        <p:nvSpPr>
-          <p:cNvPr id="8" name="TextBox 7"/>
-          <p:cNvSpPr txBox="1"/>
+      <p:grpSp>
+        <p:nvGrpSpPr>
+          <p:cNvPr id="17" name="Group 16"/>
+          <p:cNvGrpSpPr/>
           <p:nvPr/>
-        </p:nvSpPr>
+        </p:nvGrpSpPr>
+        <p:grpSpPr>
+          <a:xfrm>
+            <a:off x="3016252" y="4837692"/>
+            <a:ext cx="1002966" cy="881136"/>
+            <a:chOff x="3191731" y="3791537"/>
+            <a:chExt cx="1002966" cy="881136"/>
+          </a:xfrm>
+        </p:grpSpPr>
+        <p:sp>
+          <p:nvSpPr>
+            <p:cNvPr id="11" name="Oval 10"/>
+            <p:cNvSpPr/>
+            <p:nvPr/>
+          </p:nvSpPr>
+          <p:spPr>
+            <a:xfrm>
+              <a:off x="3191731" y="3791537"/>
+              <a:ext cx="931491" cy="881136"/>
+            </a:xfrm>
+            <a:prstGeom prst="ellipse">
+              <a:avLst/>
+            </a:prstGeom>
+            <a:ln>
+              <a:noFill/>
+            </a:ln>
+            <a:effectLst>
+              <a:outerShdw blurRad="149987" dist="250190" dir="8460000" algn="ctr">
+                <a:srgbClr val="000000">
+                  <a:alpha val="28000"/>
+                </a:srgbClr>
+              </a:outerShdw>
+            </a:effectLst>
+            <a:scene3d>
+              <a:camera prst="orthographicFront">
+                <a:rot lat="0" lon="0" rev="0"/>
+              </a:camera>
+              <a:lightRig rig="contrasting" dir="t">
+                <a:rot lat="0" lon="0" rev="1500000"/>
+              </a:lightRig>
+            </a:scene3d>
+            <a:sp3d prstMaterial="metal">
+              <a:bevelT w="88900" h="88900"/>
+            </a:sp3d>
+          </p:spPr>
+          <p:style>
+            <a:lnRef idx="2">
+              <a:schemeClr val="accent1">
+                <a:shade val="50000"/>
+              </a:schemeClr>
+            </a:lnRef>
+            <a:fillRef idx="1">
+              <a:schemeClr val="accent1"/>
+            </a:fillRef>
+            <a:effectRef idx="0">
+              <a:schemeClr val="accent1"/>
+            </a:effectRef>
+            <a:fontRef idx="minor">
+              <a:schemeClr val="lt1"/>
+            </a:fontRef>
+          </p:style>
+          <p:txBody>
+            <a:bodyPr rtlCol="0" anchor="ctr"/>
+            <a:lstStyle/>
+            <a:p>
+              <a:pPr algn="ctr"/>
+              <a:endParaRPr lang="fr-CH"/>
+            </a:p>
+          </p:txBody>
+        </p:sp>
+        <p:sp>
+          <p:nvSpPr>
+            <p:cNvPr id="8" name="TextBox 7"/>
+            <p:cNvSpPr txBox="1"/>
+            <p:nvPr/>
+          </p:nvSpPr>
+          <p:spPr>
+            <a:xfrm>
+              <a:off x="3314480" y="4068334"/>
+              <a:ext cx="880217" cy="369332"/>
+            </a:xfrm>
+            <a:prstGeom prst="rect">
+              <a:avLst/>
+            </a:prstGeom>
+            <a:noFill/>
+          </p:spPr>
+          <p:txBody>
+            <a:bodyPr wrap="square" rtlCol="0">
+              <a:spAutoFit/>
+            </a:bodyPr>
+            <a:lstStyle/>
+            <a:p>
+              <a:r>
+                <a:rPr lang="fr-CH" dirty="0" smtClean="0"/>
+                <a:t>Clock</a:t>
+              </a:r>
+            </a:p>
+          </p:txBody>
+        </p:sp>
+      </p:grpSp>
+      <p:grpSp>
+        <p:nvGrpSpPr>
+          <p:cNvPr id="3" name="Group 2"/>
+          <p:cNvGrpSpPr/>
+          <p:nvPr/>
+        </p:nvGrpSpPr>
+        <p:grpSpPr>
+          <a:xfrm>
+            <a:off x="6622992" y="4886240"/>
+            <a:ext cx="1573851" cy="812772"/>
+            <a:chOff x="5719271" y="3833326"/>
+            <a:chExt cx="1573851" cy="812772"/>
+          </a:xfrm>
+        </p:grpSpPr>
+        <p:sp>
+          <p:nvSpPr>
+            <p:cNvPr id="12" name="Oval 11"/>
+            <p:cNvSpPr/>
+            <p:nvPr/>
+          </p:nvSpPr>
+          <p:spPr>
+            <a:xfrm>
+              <a:off x="5719271" y="3833326"/>
+              <a:ext cx="1427145" cy="812772"/>
+            </a:xfrm>
+            <a:prstGeom prst="ellipse">
+              <a:avLst/>
+            </a:prstGeom>
+            <a:ln>
+              <a:noFill/>
+            </a:ln>
+            <a:effectLst>
+              <a:outerShdw blurRad="149987" dist="250190" dir="8460000" algn="ctr">
+                <a:srgbClr val="000000">
+                  <a:alpha val="28000"/>
+                </a:srgbClr>
+              </a:outerShdw>
+            </a:effectLst>
+            <a:scene3d>
+              <a:camera prst="orthographicFront">
+                <a:rot lat="0" lon="0" rev="0"/>
+              </a:camera>
+              <a:lightRig rig="contrasting" dir="t">
+                <a:rot lat="0" lon="0" rev="1500000"/>
+              </a:lightRig>
+            </a:scene3d>
+            <a:sp3d prstMaterial="metal">
+              <a:bevelT w="88900" h="88900"/>
+            </a:sp3d>
+          </p:spPr>
+          <p:style>
+            <a:lnRef idx="2">
+              <a:schemeClr val="accent1">
+                <a:shade val="50000"/>
+              </a:schemeClr>
+            </a:lnRef>
+            <a:fillRef idx="1">
+              <a:schemeClr val="accent1"/>
+            </a:fillRef>
+            <a:effectRef idx="0">
+              <a:schemeClr val="accent1"/>
+            </a:effectRef>
+            <a:fontRef idx="minor">
+              <a:schemeClr val="lt1"/>
+            </a:fontRef>
+          </p:style>
+          <p:txBody>
+            <a:bodyPr rtlCol="0" anchor="ctr"/>
+            <a:lstStyle/>
+            <a:p>
+              <a:pPr algn="ctr"/>
+              <a:endParaRPr lang="fr-CH"/>
+            </a:p>
+          </p:txBody>
+        </p:sp>
+        <p:sp>
+          <p:nvSpPr>
+            <p:cNvPr id="9" name="TextBox 8"/>
+            <p:cNvSpPr txBox="1"/>
+            <p:nvPr/>
+          </p:nvSpPr>
+          <p:spPr>
+            <a:xfrm>
+              <a:off x="5838913" y="4068333"/>
+              <a:ext cx="1454209" cy="369332"/>
+            </a:xfrm>
+            <a:prstGeom prst="rect">
+              <a:avLst/>
+            </a:prstGeom>
+            <a:noFill/>
+          </p:spPr>
+          <p:txBody>
+            <a:bodyPr wrap="square" rtlCol="0">
+              <a:spAutoFit/>
+            </a:bodyPr>
+            <a:lstStyle/>
+            <a:p>
+              <a:r>
+                <a:rPr lang="fr-CH" dirty="0" smtClean="0"/>
+                <a:t>StopWatch</a:t>
+              </a:r>
+            </a:p>
+          </p:txBody>
+        </p:sp>
+      </p:grpSp>
+      <p:grpSp>
+        <p:nvGrpSpPr>
+          <p:cNvPr id="16" name="Group 15"/>
+          <p:cNvGrpSpPr/>
+          <p:nvPr/>
+        </p:nvGrpSpPr>
+        <p:grpSpPr>
+          <a:xfrm>
+            <a:off x="8196843" y="3488821"/>
+            <a:ext cx="1965532" cy="839347"/>
+            <a:chOff x="8765846" y="3833326"/>
+            <a:chExt cx="1965532" cy="839347"/>
+          </a:xfrm>
+        </p:grpSpPr>
+        <p:sp>
+          <p:nvSpPr>
+            <p:cNvPr id="13" name="Oval 12"/>
+            <p:cNvSpPr/>
+            <p:nvPr/>
+          </p:nvSpPr>
+          <p:spPr>
+            <a:xfrm>
+              <a:off x="8765846" y="3833326"/>
+              <a:ext cx="1965532" cy="839347"/>
+            </a:xfrm>
+            <a:prstGeom prst="ellipse">
+              <a:avLst/>
+            </a:prstGeom>
+            <a:ln>
+              <a:noFill/>
+            </a:ln>
+            <a:effectLst>
+              <a:outerShdw blurRad="149987" dist="250190" dir="8460000" algn="ctr">
+                <a:srgbClr val="000000">
+                  <a:alpha val="28000"/>
+                </a:srgbClr>
+              </a:outerShdw>
+            </a:effectLst>
+            <a:scene3d>
+              <a:camera prst="orthographicFront">
+                <a:rot lat="0" lon="0" rev="0"/>
+              </a:camera>
+              <a:lightRig rig="contrasting" dir="t">
+                <a:rot lat="0" lon="0" rev="1500000"/>
+              </a:lightRig>
+            </a:scene3d>
+            <a:sp3d prstMaterial="metal">
+              <a:bevelT w="88900" h="88900"/>
+            </a:sp3d>
+          </p:spPr>
+          <p:style>
+            <a:lnRef idx="2">
+              <a:schemeClr val="accent1">
+                <a:shade val="50000"/>
+              </a:schemeClr>
+            </a:lnRef>
+            <a:fillRef idx="1">
+              <a:schemeClr val="accent1"/>
+            </a:fillRef>
+            <a:effectRef idx="0">
+              <a:schemeClr val="accent1"/>
+            </a:effectRef>
+            <a:fontRef idx="minor">
+              <a:schemeClr val="lt1"/>
+            </a:fontRef>
+          </p:style>
+          <p:txBody>
+            <a:bodyPr rtlCol="0" anchor="ctr"/>
+            <a:lstStyle/>
+            <a:p>
+              <a:pPr algn="ctr"/>
+              <a:endParaRPr lang="fr-CH"/>
+            </a:p>
+          </p:txBody>
+        </p:sp>
+        <p:sp>
+          <p:nvSpPr>
+            <p:cNvPr id="10" name="TextBox 9"/>
+            <p:cNvSpPr txBox="1"/>
+            <p:nvPr/>
+          </p:nvSpPr>
+          <p:spPr>
+            <a:xfrm>
+              <a:off x="8843968" y="4055046"/>
+              <a:ext cx="1726252" cy="369332"/>
+            </a:xfrm>
+            <a:prstGeom prst="rect">
+              <a:avLst/>
+            </a:prstGeom>
+            <a:noFill/>
+          </p:spPr>
+          <p:txBody>
+            <a:bodyPr wrap="square" rtlCol="0">
+              <a:spAutoFit/>
+            </a:bodyPr>
+            <a:lstStyle/>
+            <a:p>
+              <a:r>
+                <a:rPr lang="fr-CH" dirty="0" smtClean="0"/>
+                <a:t>DisplayManager</a:t>
+              </a:r>
+            </a:p>
+          </p:txBody>
+        </p:sp>
+      </p:grpSp>
+      <p:grpSp>
+        <p:nvGrpSpPr>
+          <p:cNvPr id="20" name="Group 19"/>
+          <p:cNvGrpSpPr/>
+          <p:nvPr/>
+        </p:nvGrpSpPr>
+        <p:grpSpPr>
+          <a:xfrm>
+            <a:off x="4520548" y="5938140"/>
+            <a:ext cx="985149" cy="714506"/>
+            <a:chOff x="4557048" y="5715710"/>
+            <a:chExt cx="985149" cy="714506"/>
+          </a:xfrm>
+        </p:grpSpPr>
+        <p:sp>
+          <p:nvSpPr>
+            <p:cNvPr id="14" name="Oval 13"/>
+            <p:cNvSpPr/>
+            <p:nvPr/>
+          </p:nvSpPr>
+          <p:spPr>
+            <a:xfrm>
+              <a:off x="4557048" y="5715710"/>
+              <a:ext cx="804729" cy="714506"/>
+            </a:xfrm>
+            <a:prstGeom prst="ellipse">
+              <a:avLst/>
+            </a:prstGeom>
+            <a:ln>
+              <a:noFill/>
+            </a:ln>
+            <a:effectLst>
+              <a:outerShdw blurRad="149987" dist="250190" dir="8460000" algn="ctr">
+                <a:srgbClr val="000000">
+                  <a:alpha val="28000"/>
+                </a:srgbClr>
+              </a:outerShdw>
+            </a:effectLst>
+            <a:scene3d>
+              <a:camera prst="orthographicFront">
+                <a:rot lat="0" lon="0" rev="0"/>
+              </a:camera>
+              <a:lightRig rig="contrasting" dir="t">
+                <a:rot lat="0" lon="0" rev="1500000"/>
+              </a:lightRig>
+            </a:scene3d>
+            <a:sp3d prstMaterial="metal">
+              <a:bevelT w="88900" h="88900"/>
+            </a:sp3d>
+          </p:spPr>
+          <p:style>
+            <a:lnRef idx="2">
+              <a:schemeClr val="accent1">
+                <a:shade val="50000"/>
+              </a:schemeClr>
+            </a:lnRef>
+            <a:fillRef idx="1">
+              <a:schemeClr val="accent1"/>
+            </a:fillRef>
+            <a:effectRef idx="0">
+              <a:schemeClr val="accent1"/>
+            </a:effectRef>
+            <a:fontRef idx="minor">
+              <a:schemeClr val="lt1"/>
+            </a:fontRef>
+          </p:style>
+          <p:txBody>
+            <a:bodyPr rtlCol="0" anchor="ctr"/>
+            <a:lstStyle/>
+            <a:p>
+              <a:pPr algn="ctr"/>
+              <a:endParaRPr lang="fr-CH"/>
+            </a:p>
+          </p:txBody>
+        </p:sp>
+        <p:sp>
+          <p:nvSpPr>
+            <p:cNvPr id="15" name="TextBox 14"/>
+            <p:cNvSpPr txBox="1"/>
+            <p:nvPr/>
+          </p:nvSpPr>
+          <p:spPr>
+            <a:xfrm>
+              <a:off x="4661980" y="5871965"/>
+              <a:ext cx="880217" cy="369332"/>
+            </a:xfrm>
+            <a:prstGeom prst="rect">
+              <a:avLst/>
+            </a:prstGeom>
+            <a:noFill/>
+          </p:spPr>
+          <p:txBody>
+            <a:bodyPr wrap="square" rtlCol="0">
+              <a:spAutoFit/>
+            </a:bodyPr>
+            <a:lstStyle/>
+            <a:p>
+              <a:r>
+                <a:rPr lang="fr-CH" dirty="0" smtClean="0"/>
+                <a:t>Tools</a:t>
+              </a:r>
+            </a:p>
+          </p:txBody>
+        </p:sp>
+      </p:grpSp>
+      <p:cxnSp>
+        <p:nvCxnSpPr>
+          <p:cNvPr id="21" name="Straight Arrow Connector 20"/>
+          <p:cNvCxnSpPr>
+            <a:stCxn id="4" idx="4"/>
+            <a:endCxn id="6" idx="0"/>
+          </p:cNvCxnSpPr>
+          <p:nvPr/>
+        </p:nvCxnSpPr>
         <p:spPr>
           <a:xfrm>
-            <a:off x="2657741" y="4110521"/>
-            <a:ext cx="880217" cy="369332"/>
+            <a:off x="5999145" y="1812169"/>
+            <a:ext cx="1" cy="649945"/>
           </a:xfrm>
-          <a:prstGeom prst="rect">
+          <a:prstGeom prst="straightConnector1">
             <a:avLst/>
           </a:prstGeom>
-          <a:noFill/>
+          <a:ln>
+            <a:solidFill>
+              <a:schemeClr val="tx1"/>
+            </a:solidFill>
+            <a:tailEnd type="triangle"/>
+          </a:ln>
         </p:spPr>
-        <p:txBody>
-          <a:bodyPr wrap="square" rtlCol="0">
-            <a:spAutoFit/>
-          </a:bodyPr>
-          <a:lstStyle/>
-          <a:p>
-            <a:r>
-              <a:rPr lang="fr-CH" dirty="0" smtClean="0"/>
-              <a:t>Clock</a:t>
-            </a:r>
-          </a:p>
-        </p:txBody>
-      </p:sp>
-      <p:sp>
-        <p:nvSpPr>
-          <p:cNvPr id="9" name="TextBox 8"/>
-          <p:cNvSpPr txBox="1"/>
+        <p:style>
+          <a:lnRef idx="1">
+            <a:schemeClr val="accent1"/>
+          </a:lnRef>
+          <a:fillRef idx="0">
+            <a:schemeClr val="accent1"/>
+          </a:fillRef>
+          <a:effectRef idx="0">
+            <a:schemeClr val="accent1"/>
+          </a:effectRef>
+          <a:fontRef idx="minor">
+            <a:schemeClr val="tx1"/>
+          </a:fontRef>
+        </p:style>
+      </p:cxnSp>
+      <p:cxnSp>
+        <p:nvCxnSpPr>
+          <p:cNvPr id="26" name="Curved Connector 25"/>
+          <p:cNvCxnSpPr>
+            <a:stCxn id="6" idx="6"/>
+            <a:endCxn id="13" idx="2"/>
+          </p:cNvCxnSpPr>
           <p:nvPr/>
-        </p:nvSpPr>
+        </p:nvCxnSpPr>
         <p:spPr>
           <a:xfrm>
-            <a:off x="5425153" y="4110521"/>
-            <a:ext cx="1454209" cy="369332"/>
+            <a:off x="6887908" y="2876586"/>
+            <a:ext cx="1308935" cy="1031909"/>
           </a:xfrm>
-          <a:prstGeom prst="rect">
+          <a:prstGeom prst="curvedConnector3">
             <a:avLst/>
           </a:prstGeom>
-          <a:noFill/>
+          <a:ln>
+            <a:solidFill>
+              <a:schemeClr val="tx1"/>
+            </a:solidFill>
+            <a:tailEnd type="triangle"/>
+          </a:ln>
         </p:spPr>
-        <p:txBody>
-          <a:bodyPr wrap="square" rtlCol="0">
-            <a:spAutoFit/>
-          </a:bodyPr>
-          <a:lstStyle/>
-          <a:p>
-            <a:r>
-              <a:rPr lang="fr-CH" dirty="0" smtClean="0"/>
-              <a:t>StopWatch</a:t>
-            </a:r>
-          </a:p>
-        </p:txBody>
-      </p:sp>
-      <p:sp>
-        <p:nvSpPr>
-          <p:cNvPr id="10" name="TextBox 9"/>
-          <p:cNvSpPr txBox="1"/>
+        <p:style>
+          <a:lnRef idx="1">
+            <a:schemeClr val="accent1"/>
+          </a:lnRef>
+          <a:fillRef idx="0">
+            <a:schemeClr val="accent1"/>
+          </a:fillRef>
+          <a:effectRef idx="0">
+            <a:schemeClr val="accent1"/>
+          </a:effectRef>
+          <a:fontRef idx="minor">
+            <a:schemeClr val="tx1"/>
+          </a:fontRef>
+        </p:style>
+      </p:cxnSp>
+      <p:cxnSp>
+        <p:nvCxnSpPr>
+          <p:cNvPr id="29" name="Curved Connector 28"/>
+          <p:cNvCxnSpPr>
+            <a:stCxn id="6" idx="2"/>
+          </p:cNvCxnSpPr>
+          <p:nvPr/>
+        </p:nvCxnSpPr>
+        <p:spPr>
+          <a:xfrm rot="10800000" flipV="1">
+            <a:off x="3546989" y="2876586"/>
+            <a:ext cx="1563395" cy="1961106"/>
+          </a:xfrm>
+          <a:prstGeom prst="curvedConnector2">
+            <a:avLst/>
+          </a:prstGeom>
+          <a:ln>
+            <a:solidFill>
+              <a:schemeClr val="tx1"/>
+            </a:solidFill>
+            <a:tailEnd type="triangle"/>
+          </a:ln>
+        </p:spPr>
+        <p:style>
+          <a:lnRef idx="1">
+            <a:schemeClr val="accent1"/>
+          </a:lnRef>
+          <a:fillRef idx="0">
+            <a:schemeClr val="accent1"/>
+          </a:fillRef>
+          <a:effectRef idx="0">
+            <a:schemeClr val="accent1"/>
+          </a:effectRef>
+          <a:fontRef idx="minor">
+            <a:schemeClr val="tx1"/>
+          </a:fontRef>
+        </p:style>
+      </p:cxnSp>
+      <p:cxnSp>
+        <p:nvCxnSpPr>
+          <p:cNvPr id="32" name="Curved Connector 31"/>
+          <p:cNvCxnSpPr>
+            <a:stCxn id="12" idx="2"/>
+            <a:endCxn id="14" idx="7"/>
+          </p:cNvCxnSpPr>
+          <p:nvPr/>
+        </p:nvCxnSpPr>
+        <p:spPr>
+          <a:xfrm rot="10800000" flipV="1">
+            <a:off x="5207428" y="5292625"/>
+            <a:ext cx="1415565" cy="750151"/>
+          </a:xfrm>
+          <a:prstGeom prst="curvedConnector2">
+            <a:avLst/>
+          </a:prstGeom>
+          <a:ln>
+            <a:solidFill>
+              <a:schemeClr val="tx1"/>
+            </a:solidFill>
+            <a:tailEnd type="triangle"/>
+          </a:ln>
+        </p:spPr>
+        <p:style>
+          <a:lnRef idx="1">
+            <a:schemeClr val="accent1"/>
+          </a:lnRef>
+          <a:fillRef idx="0">
+            <a:schemeClr val="accent1"/>
+          </a:fillRef>
+          <a:effectRef idx="0">
+            <a:schemeClr val="accent1"/>
+          </a:effectRef>
+          <a:fontRef idx="minor">
+            <a:schemeClr val="tx1"/>
+          </a:fontRef>
+        </p:style>
+      </p:cxnSp>
+      <p:cxnSp>
+        <p:nvCxnSpPr>
+          <p:cNvPr id="41" name="Curved Connector 40"/>
+          <p:cNvCxnSpPr>
+            <a:stCxn id="11" idx="4"/>
+            <a:endCxn id="14" idx="2"/>
+          </p:cNvCxnSpPr>
+          <p:nvPr/>
+        </p:nvCxnSpPr>
+        <p:spPr>
+          <a:xfrm rot="16200000" flipH="1">
+            <a:off x="3712991" y="5487835"/>
+            <a:ext cx="576565" cy="1038550"/>
+          </a:xfrm>
+          <a:prstGeom prst="curvedConnector2">
+            <a:avLst/>
+          </a:prstGeom>
+          <a:ln>
+            <a:solidFill>
+              <a:schemeClr val="tx1"/>
+            </a:solidFill>
+            <a:tailEnd type="triangle"/>
+          </a:ln>
+        </p:spPr>
+        <p:style>
+          <a:lnRef idx="1">
+            <a:schemeClr val="accent1"/>
+          </a:lnRef>
+          <a:fillRef idx="0">
+            <a:schemeClr val="accent1"/>
+          </a:fillRef>
+          <a:effectRef idx="0">
+            <a:schemeClr val="accent1"/>
+          </a:effectRef>
+          <a:fontRef idx="minor">
+            <a:schemeClr val="tx1"/>
+          </a:fontRef>
+        </p:style>
+      </p:cxnSp>
+      <p:sp>
+        <p:nvSpPr>
+          <p:cNvPr id="22" name="Oval 21"/>
+          <p:cNvSpPr/>
           <p:nvPr/>
         </p:nvSpPr>
         <p:spPr>
           <a:xfrm>
-            <a:off x="8280874" y="4141368"/>
-            <a:ext cx="1726252" cy="369332"/>
-          </a:xfrm>
-          <a:prstGeom prst="rect">
-            <a:avLst/>
-          </a:prstGeom>
-          <a:noFill/>
-        </p:spPr>
-        <p:txBody>
-          <a:bodyPr wrap="square" rtlCol="0">
-            <a:spAutoFit/>
-          </a:bodyPr>
-          <a:lstStyle/>
-          <a:p>
-            <a:r>
-              <a:rPr lang="fr-CH" dirty="0" smtClean="0"/>
-              <a:t>DisplayManager</a:t>
-            </a:r>
-          </a:p>
-        </p:txBody>
-      </p:sp>
-      <p:sp>
-        <p:nvSpPr>
-          <p:cNvPr id="14" name="Oval 13"/>
-          <p:cNvSpPr/>
-          <p:nvPr/>
-        </p:nvSpPr>
-        <p:spPr>
-          <a:xfrm>
-            <a:off x="4006554" y="5377219"/>
-            <a:ext cx="804729" cy="714506"/>
+            <a:off x="9972073" y="4865345"/>
+            <a:ext cx="931491" cy="881136"/>
           </a:xfrm>
           <a:prstGeom prst="ellipse">
             <a:avLst/>
@@ -3473,54 +3822,110 @@
           <a:lstStyle/>
           <a:p>
             <a:pPr algn="ctr"/>
-            <a:endParaRPr lang="fr-CH"/>
-          </a:p>
-        </p:txBody>
-      </p:sp>
-      <p:sp>
-        <p:nvSpPr>
-          <p:cNvPr id="15" name="TextBox 14"/>
-          <p:cNvSpPr txBox="1"/>
+            <a:r>
+              <a:rPr lang="fr-CH" dirty="0" smtClean="0">
+                <a:solidFill>
+                  <a:schemeClr val="tx1"/>
+                </a:solidFill>
+              </a:rPr>
+              <a:t>LCD</a:t>
+            </a:r>
+            <a:endParaRPr lang="fr-CH" dirty="0">
+              <a:solidFill>
+                <a:schemeClr val="tx1"/>
+              </a:solidFill>
+            </a:endParaRPr>
+          </a:p>
+        </p:txBody>
+      </p:sp>
+      <p:sp>
+        <p:nvSpPr>
+          <p:cNvPr id="23" name="Oval 22"/>
+          <p:cNvSpPr/>
           <p:nvPr/>
         </p:nvSpPr>
         <p:spPr>
           <a:xfrm>
-            <a:off x="4073491" y="5531044"/>
-            <a:ext cx="880217" cy="369332"/>
+            <a:off x="1066026" y="4857063"/>
+            <a:ext cx="931491" cy="881136"/>
           </a:xfrm>
-          <a:prstGeom prst="rect">
+          <a:prstGeom prst="ellipse">
             <a:avLst/>
           </a:prstGeom>
-          <a:noFill/>
+          <a:ln>
+            <a:noFill/>
+          </a:ln>
+          <a:effectLst>
+            <a:outerShdw blurRad="149987" dist="250190" dir="8460000" algn="ctr">
+              <a:srgbClr val="000000">
+                <a:alpha val="28000"/>
+              </a:srgbClr>
+            </a:outerShdw>
+          </a:effectLst>
+          <a:scene3d>
+            <a:camera prst="orthographicFront">
+              <a:rot lat="0" lon="0" rev="0"/>
+            </a:camera>
+            <a:lightRig rig="contrasting" dir="t">
+              <a:rot lat="0" lon="0" rev="1500000"/>
+            </a:lightRig>
+          </a:scene3d>
+          <a:sp3d prstMaterial="metal">
+            <a:bevelT w="88900" h="88900"/>
+          </a:sp3d>
         </p:spPr>
-        <p:txBody>
-          <a:bodyPr wrap="square" rtlCol="0">
-            <a:spAutoFit/>
-          </a:bodyPr>
-          <a:lstStyle/>
-          <a:p>
-            <a:r>
-              <a:rPr lang="fr-CH" dirty="0" smtClean="0"/>
-              <a:t>Tools</a:t>
-            </a:r>
+        <p:style>
+          <a:lnRef idx="2">
+            <a:schemeClr val="accent1">
+              <a:shade val="50000"/>
+            </a:schemeClr>
+          </a:lnRef>
+          <a:fillRef idx="1">
+            <a:schemeClr val="accent1"/>
+          </a:fillRef>
+          <a:effectRef idx="0">
+            <a:schemeClr val="accent1"/>
+          </a:effectRef>
+          <a:fontRef idx="minor">
+            <a:schemeClr val="lt1"/>
+          </a:fontRef>
+        </p:style>
+        <p:txBody>
+          <a:bodyPr rtlCol="0" anchor="ctr"/>
+          <a:lstStyle/>
+          <a:p>
+            <a:pPr algn="ctr"/>
+            <a:r>
+              <a:rPr lang="fr-CH" dirty="0" smtClean="0">
+                <a:solidFill>
+                  <a:schemeClr val="tx1"/>
+                </a:solidFill>
+              </a:rPr>
+              <a:t>USB</a:t>
+            </a:r>
+            <a:endParaRPr lang="fr-CH" dirty="0">
+              <a:solidFill>
+                <a:schemeClr val="tx1"/>
+              </a:solidFill>
+            </a:endParaRPr>
           </a:p>
         </p:txBody>
       </p:sp>
       <p:cxnSp>
         <p:nvCxnSpPr>
-          <p:cNvPr id="21" name="Straight Arrow Connector 20"/>
+          <p:cNvPr id="33" name="Curved Connector 32"/>
           <p:cNvCxnSpPr>
-            <a:stCxn id="4" idx="4"/>
-            <a:endCxn id="6" idx="0"/>
+            <a:stCxn id="6" idx="2"/>
+            <a:endCxn id="23" idx="7"/>
           </p:cNvCxnSpPr>
           <p:nvPr/>
         </p:nvCxnSpPr>
         <p:spPr>
-          <a:xfrm>
-            <a:off x="5999145" y="1812169"/>
-            <a:ext cx="1" cy="649945"/>
+          <a:xfrm rot="10800000" flipV="1">
+            <a:off x="1861103" y="2876586"/>
+            <a:ext cx="3249280" cy="2109516"/>
           </a:xfrm>
-          <a:prstGeom prst="straightConnector1">
+          <a:prstGeom prst="curvedConnector2">
             <a:avLst/>
           </a:prstGeom>
           <a:ln>
@@ -3547,54 +3952,17 @@
       </p:cxnSp>
       <p:cxnSp>
         <p:nvCxnSpPr>
-          <p:cNvPr id="24" name="Straight Arrow Connector 23"/>
+          <p:cNvPr id="35" name="Curved Connector 34"/>
           <p:cNvCxnSpPr>
-            <a:endCxn id="12" idx="0"/>
+            <a:stCxn id="13" idx="5"/>
+            <a:endCxn id="22" idx="0"/>
           </p:cNvCxnSpPr>
           <p:nvPr/>
         </p:nvCxnSpPr>
         <p:spPr>
-          <a:xfrm>
-            <a:off x="5999145" y="3291057"/>
-            <a:ext cx="0" cy="622917"/>
-          </a:xfrm>
-          <a:prstGeom prst="straightConnector1">
-            <a:avLst/>
-          </a:prstGeom>
-          <a:ln>
-            <a:solidFill>
-              <a:schemeClr val="tx1"/>
-            </a:solidFill>
-            <a:tailEnd type="triangle"/>
-          </a:ln>
-        </p:spPr>
-        <p:style>
-          <a:lnRef idx="1">
-            <a:schemeClr val="accent1"/>
-          </a:lnRef>
-          <a:fillRef idx="0">
-            <a:schemeClr val="accent1"/>
-          </a:fillRef>
-          <a:effectRef idx="0">
-            <a:schemeClr val="accent1"/>
-          </a:effectRef>
-          <a:fontRef idx="minor">
-            <a:schemeClr val="tx1"/>
-          </a:fontRef>
-        </p:style>
-      </p:cxnSp>
-      <p:cxnSp>
-        <p:nvCxnSpPr>
-          <p:cNvPr id="26" name="Curved Connector 25"/>
-          <p:cNvCxnSpPr>
-            <a:endCxn id="13" idx="2"/>
-          </p:cNvCxnSpPr>
-          <p:nvPr/>
-        </p:nvCxnSpPr>
-        <p:spPr>
-          <a:xfrm>
-            <a:off x="6710585" y="3051315"/>
-            <a:ext cx="1450649" cy="1273782"/>
+          <a:xfrm rot="16200000" flipH="1">
+            <a:off x="9826126" y="4253651"/>
+            <a:ext cx="660097" cy="563289"/>
           </a:xfrm>
           <a:prstGeom prst="curvedConnector3">
             <a:avLst/>
@@ -3623,14 +3991,17 @@
       </p:cxnSp>
       <p:cxnSp>
         <p:nvCxnSpPr>
-          <p:cNvPr id="29" name="Curved Connector 28"/>
-          <p:cNvCxnSpPr/>
+          <p:cNvPr id="43" name="Curved Connector 42"/>
+          <p:cNvCxnSpPr>
+            <a:stCxn id="6" idx="3"/>
+            <a:endCxn id="12" idx="1"/>
+          </p:cNvCxnSpPr>
           <p:nvPr/>
         </p:nvCxnSpPr>
         <p:spPr>
-          <a:xfrm rot="10800000" flipV="1">
-            <a:off x="3452504" y="3037537"/>
-            <a:ext cx="1781795" cy="1287560"/>
+          <a:xfrm rot="16200000" flipH="1">
+            <a:off x="5183541" y="3356815"/>
+            <a:ext cx="1835607" cy="1461297"/>
           </a:xfrm>
           <a:prstGeom prst="curvedConnector3">
             <a:avLst/>
@@ -3659,19 +4030,22 @@
       </p:cxnSp>
       <p:cxnSp>
         <p:nvCxnSpPr>
-          <p:cNvPr id="32" name="Curved Connector 31"/>
+          <p:cNvPr id="45" name="Curved Connector 44"/>
           <p:cNvCxnSpPr>
-            <a:stCxn id="12" idx="4"/>
+            <a:stCxn id="13" idx="3"/>
+            <a:endCxn id="11" idx="7"/>
           </p:cNvCxnSpPr>
           <p:nvPr/>
         </p:nvCxnSpPr>
         <p:spPr>
           <a:xfrm rot="5400000">
-            <a:off x="4925686" y="4612343"/>
-            <a:ext cx="959056" cy="1187862"/>
+            <a:off x="5767268" y="2249310"/>
+            <a:ext cx="761483" cy="4673359"/>
           </a:xfrm>
-          <a:prstGeom prst="curvedConnector2">
-            <a:avLst/>
+          <a:prstGeom prst="curvedConnector3">
+            <a:avLst>
+              <a:gd name="adj1" fmla="val 50000"/>
+            </a:avLst>
           </a:prstGeom>
           <a:ln>
             <a:solidFill>
@@ -3697,92 +4071,17 @@
       </p:cxnSp>
       <p:cxnSp>
         <p:nvCxnSpPr>
-          <p:cNvPr id="41" name="Curved Connector 40"/>
+          <p:cNvPr id="48" name="Curved Connector 47"/>
           <p:cNvCxnSpPr>
-            <a:stCxn id="11" idx="4"/>
+            <a:stCxn id="13" idx="4"/>
+            <a:endCxn id="12" idx="7"/>
           </p:cNvCxnSpPr>
           <p:nvPr/>
         </p:nvCxnSpPr>
         <p:spPr>
-          <a:xfrm rot="16200000" flipH="1">
-            <a:off x="3034218" y="4713466"/>
-            <a:ext cx="924874" cy="1019798"/>
-          </a:xfrm>
-          <a:prstGeom prst="curvedConnector2">
-            <a:avLst/>
-          </a:prstGeom>
-          <a:ln>
-            <a:solidFill>
-              <a:schemeClr val="tx1"/>
-            </a:solidFill>
-            <a:tailEnd type="triangle"/>
-          </a:ln>
-        </p:spPr>
-        <p:style>
-          <a:lnRef idx="1">
-            <a:schemeClr val="accent1"/>
-          </a:lnRef>
-          <a:fillRef idx="0">
-            <a:schemeClr val="accent1"/>
-          </a:fillRef>
-          <a:effectRef idx="0">
-            <a:schemeClr val="accent1"/>
-          </a:effectRef>
-          <a:fontRef idx="minor">
-            <a:schemeClr val="tx1"/>
-          </a:fontRef>
-        </p:style>
-      </p:cxnSp>
-      <p:cxnSp>
-        <p:nvCxnSpPr>
-          <p:cNvPr id="47" name="Curved Connector 46"/>
-          <p:cNvCxnSpPr>
-            <a:endCxn id="12" idx="2"/>
-          </p:cNvCxnSpPr>
-          <p:nvPr/>
-        </p:nvCxnSpPr>
-        <p:spPr>
-          <a:xfrm rot="5400000" flipH="1" flipV="1">
-            <a:off x="4370635" y="4507483"/>
-            <a:ext cx="1102060" cy="727814"/>
-          </a:xfrm>
-          <a:prstGeom prst="curvedConnector2">
-            <a:avLst/>
-          </a:prstGeom>
-          <a:ln>
-            <a:solidFill>
-              <a:schemeClr val="tx1"/>
-            </a:solidFill>
-            <a:tailEnd type="triangle"/>
-          </a:ln>
-        </p:spPr>
-        <p:style>
-          <a:lnRef idx="1">
-            <a:schemeClr val="accent1"/>
-          </a:lnRef>
-          <a:fillRef idx="0">
-            <a:schemeClr val="accent1"/>
-          </a:fillRef>
-          <a:effectRef idx="0">
-            <a:schemeClr val="accent1"/>
-          </a:effectRef>
-          <a:fontRef idx="minor">
-            <a:schemeClr val="tx1"/>
-          </a:fontRef>
-        </p:style>
-      </p:cxnSp>
-      <p:cxnSp>
-        <p:nvCxnSpPr>
-          <p:cNvPr id="51" name="Curved Connector 50"/>
-          <p:cNvCxnSpPr>
-            <a:endCxn id="11" idx="5"/>
-          </p:cNvCxnSpPr>
-          <p:nvPr/>
-        </p:nvCxnSpPr>
-        <p:spPr>
-          <a:xfrm rot="16200000" flipV="1">
-            <a:off x="3265902" y="4682074"/>
-            <a:ext cx="899154" cy="798783"/>
+          <a:xfrm rot="5400000">
+            <a:off x="8171823" y="3997482"/>
+            <a:ext cx="677100" cy="1338473"/>
           </a:xfrm>
           <a:prstGeom prst="curvedConnector3">
             <a:avLst>

</xml_diff>